<commit_message>
Agrega definición de algoritmo.
</commit_message>
<xml_diff>
--- a/Clase_1_Contextualizacion_1.0.pptx
+++ b/Clase_1_Contextualizacion_1.0.pptx
@@ -5,7 +5,7 @@
     <p:sldMasterId id="2147483648" r:id="rId1"/>
   </p:sldMasterIdLst>
   <p:notesMasterIdLst>
-    <p:notesMasterId r:id="rId19"/>
+    <p:notesMasterId r:id="rId22"/>
   </p:notesMasterIdLst>
   <p:sldIdLst>
     <p:sldId id="256" r:id="rId2"/>
@@ -25,6 +25,9 @@
     <p:sldId id="270" r:id="rId16"/>
     <p:sldId id="271" r:id="rId17"/>
     <p:sldId id="272" r:id="rId18"/>
+    <p:sldId id="273" r:id="rId19"/>
+    <p:sldId id="274" r:id="rId20"/>
+    <p:sldId id="275" r:id="rId21"/>
   </p:sldIdLst>
   <p:sldSz cx="12192000" cy="6858000"/>
   <p:notesSz cx="6858000" cy="9144000"/>
@@ -8059,6 +8062,2269 @@
 </p:sld>
 </file>
 
+<file path=ppt/slides/slide18.xml><?xml version="1.0" encoding="utf-8"?>
+<p:sld xmlns:a="http://schemas.openxmlformats.org/drawingml/2006/main" xmlns:r="http://schemas.openxmlformats.org/officeDocument/2006/relationships" xmlns:p="http://schemas.openxmlformats.org/presentationml/2006/main">
+  <p:cSld>
+    <p:spTree>
+      <p:nvGrpSpPr>
+        <p:cNvPr id="1" name=""/>
+        <p:cNvGrpSpPr/>
+        <p:nvPr/>
+      </p:nvGrpSpPr>
+      <p:grpSpPr>
+        <a:xfrm>
+          <a:off x="0" y="0"/>
+          <a:ext cx="0" cy="0"/>
+          <a:chOff x="0" y="0"/>
+          <a:chExt cx="0" cy="0"/>
+        </a:xfrm>
+      </p:grpSpPr>
+      <p:sp>
+        <p:nvSpPr>
+          <p:cNvPr id="2" name="Title 1"/>
+          <p:cNvSpPr>
+            <a:spLocks noGrp="1"/>
+          </p:cNvSpPr>
+          <p:nvPr>
+            <p:ph type="title"/>
+          </p:nvPr>
+        </p:nvSpPr>
+        <p:spPr/>
+        <p:txBody>
+          <a:bodyPr/>
+          <a:lstStyle/>
+          <a:p>
+            <a:r>
+              <a:rPr lang="es-ES_tradnl" dirty="0" smtClean="0"/>
+              <a:t>¿Qué es un algoritmo?</a:t>
+            </a:r>
+            <a:endParaRPr lang="es-ES_tradnl" dirty="0"/>
+          </a:p>
+        </p:txBody>
+      </p:sp>
+      <p:pic>
+        <p:nvPicPr>
+          <p:cNvPr id="4098" name="Picture 2" descr="https://upload.wikimedia.org/wikipedia/commons/thumb/d/db/Euclid_flowchart.svg/220px-Euclid_flowchart.svg.png"/>
+          <p:cNvPicPr>
+            <a:picLocks noGrp="1" noChangeAspect="1" noChangeArrowheads="1"/>
+          </p:cNvPicPr>
+          <p:nvPr>
+            <p:ph idx="1"/>
+          </p:nvPr>
+        </p:nvPicPr>
+        <p:blipFill>
+          <a:blip r:embed="rId2">
+            <a:extLst>
+              <a:ext uri="{28A0092B-C50C-407E-A947-70E740481C1C}">
+                <a14:useLocalDpi xmlns:a14="http://schemas.microsoft.com/office/drawing/2010/main" val="0"/>
+              </a:ext>
+            </a:extLst>
+          </a:blip>
+          <a:srcRect/>
+          <a:stretch>
+            <a:fillRect/>
+          </a:stretch>
+        </p:blipFill>
+        <p:spPr bwMode="auto">
+          <a:xfrm>
+            <a:off x="6615112" y="1570635"/>
+            <a:ext cx="2038085" cy="4585692"/>
+          </a:xfrm>
+          <a:prstGeom prst="rect">
+            <a:avLst/>
+          </a:prstGeom>
+          <a:noFill/>
+          <a:extLst>
+            <a:ext uri="{909E8E84-426E-40DD-AFC4-6F175D3DCCD1}">
+              <a14:hiddenFill xmlns:a14="http://schemas.microsoft.com/office/drawing/2010/main">
+                <a:solidFill>
+                  <a:srgbClr val="FFFFFF"/>
+                </a:solidFill>
+              </a14:hiddenFill>
+            </a:ext>
+          </a:extLst>
+        </p:spPr>
+      </p:pic>
+      <p:sp>
+        <p:nvSpPr>
+          <p:cNvPr id="4" name="TextBox 3"/>
+          <p:cNvSpPr txBox="1"/>
+          <p:nvPr/>
+        </p:nvSpPr>
+        <p:spPr>
+          <a:xfrm>
+            <a:off x="928688" y="1930400"/>
+            <a:ext cx="5329237" cy="923330"/>
+          </a:xfrm>
+          <a:prstGeom prst="rect">
+            <a:avLst/>
+          </a:prstGeom>
+          <a:noFill/>
+        </p:spPr>
+        <p:txBody>
+          <a:bodyPr wrap="square" rtlCol="0">
+            <a:spAutoFit/>
+          </a:bodyPr>
+          <a:lstStyle/>
+          <a:p>
+            <a:r>
+              <a:rPr lang="es-ES_tradnl" dirty="0"/>
+              <a:t>“</a:t>
+            </a:r>
+            <a:r>
+              <a:rPr lang="es-ES_tradnl" dirty="0" err="1"/>
+              <a:t>An</a:t>
+            </a:r>
+            <a:r>
+              <a:rPr lang="es-ES_tradnl" dirty="0"/>
+              <a:t> </a:t>
+            </a:r>
+            <a:r>
+              <a:rPr lang="es-ES_tradnl" dirty="0" err="1"/>
+              <a:t>algorithm</a:t>
+            </a:r>
+            <a:r>
+              <a:rPr lang="es-ES_tradnl" dirty="0"/>
+              <a:t> </a:t>
+            </a:r>
+            <a:r>
+              <a:rPr lang="es-ES_tradnl" dirty="0" err="1"/>
+              <a:t>is</a:t>
+            </a:r>
+            <a:r>
+              <a:rPr lang="es-ES_tradnl" dirty="0"/>
+              <a:t> a set of </a:t>
+            </a:r>
+            <a:r>
+              <a:rPr lang="es-ES_tradnl" dirty="0" err="1"/>
+              <a:t>instructions</a:t>
+            </a:r>
+            <a:r>
+              <a:rPr lang="es-ES_tradnl" dirty="0"/>
+              <a:t>, </a:t>
+            </a:r>
+            <a:r>
+              <a:rPr lang="es-ES_tradnl" dirty="0" err="1"/>
+              <a:t>sometimes</a:t>
+            </a:r>
+            <a:r>
+              <a:rPr lang="es-ES_tradnl" dirty="0"/>
+              <a:t> </a:t>
+            </a:r>
+            <a:r>
+              <a:rPr lang="es-ES_tradnl" dirty="0" err="1"/>
+              <a:t>called</a:t>
+            </a:r>
+            <a:r>
+              <a:rPr lang="es-ES_tradnl" dirty="0"/>
+              <a:t> a </a:t>
+            </a:r>
+            <a:r>
+              <a:rPr lang="es-ES_tradnl" dirty="0" err="1"/>
+              <a:t>procedure</a:t>
+            </a:r>
+            <a:r>
+              <a:rPr lang="es-ES_tradnl" dirty="0"/>
+              <a:t> </a:t>
+            </a:r>
+            <a:r>
+              <a:rPr lang="es-ES_tradnl" dirty="0" err="1"/>
+              <a:t>or</a:t>
+            </a:r>
+            <a:r>
+              <a:rPr lang="es-ES_tradnl" dirty="0"/>
+              <a:t> a </a:t>
+            </a:r>
+            <a:r>
+              <a:rPr lang="es-ES_tradnl" dirty="0" err="1"/>
+              <a:t>function</a:t>
+            </a:r>
+            <a:r>
+              <a:rPr lang="es-ES_tradnl" dirty="0"/>
+              <a:t>, </a:t>
+            </a:r>
+            <a:r>
+              <a:rPr lang="es-ES_tradnl" dirty="0" err="1"/>
+              <a:t>that</a:t>
+            </a:r>
+            <a:r>
+              <a:rPr lang="es-ES_tradnl" dirty="0"/>
+              <a:t> </a:t>
+            </a:r>
+            <a:r>
+              <a:rPr lang="es-ES_tradnl" dirty="0" err="1"/>
+              <a:t>is</a:t>
+            </a:r>
+            <a:r>
+              <a:rPr lang="es-ES_tradnl" dirty="0"/>
+              <a:t> </a:t>
+            </a:r>
+            <a:r>
+              <a:rPr lang="es-ES_tradnl" dirty="0" err="1"/>
+              <a:t>used</a:t>
+            </a:r>
+            <a:r>
+              <a:rPr lang="es-ES_tradnl" dirty="0"/>
+              <a:t> to </a:t>
+            </a:r>
+            <a:r>
+              <a:rPr lang="es-ES_tradnl" dirty="0" err="1"/>
+              <a:t>perform</a:t>
+            </a:r>
+            <a:r>
+              <a:rPr lang="es-ES_tradnl" dirty="0"/>
+              <a:t> a </a:t>
+            </a:r>
+            <a:r>
+              <a:rPr lang="es-ES_tradnl" dirty="0" err="1"/>
+              <a:t>certain</a:t>
+            </a:r>
+            <a:r>
+              <a:rPr lang="es-ES_tradnl" dirty="0"/>
+              <a:t> </a:t>
+            </a:r>
+            <a:r>
+              <a:rPr lang="es-ES_tradnl" dirty="0" err="1"/>
+              <a:t>task</a:t>
+            </a:r>
+            <a:r>
+              <a:rPr lang="es-ES_tradnl" dirty="0"/>
+              <a:t>.” Fuente: https://</a:t>
+            </a:r>
+            <a:r>
+              <a:rPr lang="es-ES_tradnl" dirty="0" err="1"/>
+              <a:t>pc.net</a:t>
+            </a:r>
+            <a:endParaRPr lang="es-ES_tradnl" dirty="0"/>
+          </a:p>
+        </p:txBody>
+      </p:sp>
+      <p:sp>
+        <p:nvSpPr>
+          <p:cNvPr id="6" name="TextBox 5"/>
+          <p:cNvSpPr txBox="1"/>
+          <p:nvPr/>
+        </p:nvSpPr>
+        <p:spPr>
+          <a:xfrm>
+            <a:off x="928687" y="3251200"/>
+            <a:ext cx="5329237" cy="2862322"/>
+          </a:xfrm>
+          <a:prstGeom prst="rect">
+            <a:avLst/>
+          </a:prstGeom>
+          <a:noFill/>
+        </p:spPr>
+        <p:txBody>
+          <a:bodyPr wrap="square" rtlCol="0">
+            <a:spAutoFit/>
+          </a:bodyPr>
+          <a:lstStyle/>
+          <a:p>
+            <a:r>
+              <a:rPr lang="es-ES_tradnl" dirty="0"/>
+              <a:t>“</a:t>
+            </a:r>
+            <a:r>
+              <a:rPr lang="es-ES_tradnl" dirty="0" err="1"/>
+              <a:t>An</a:t>
+            </a:r>
+            <a:r>
+              <a:rPr lang="es-ES_tradnl" dirty="0"/>
+              <a:t> </a:t>
+            </a:r>
+            <a:r>
+              <a:rPr lang="es-ES_tradnl" dirty="0" err="1"/>
+              <a:t>algorithm</a:t>
+            </a:r>
+            <a:r>
+              <a:rPr lang="es-ES_tradnl" dirty="0"/>
+              <a:t> </a:t>
+            </a:r>
+            <a:r>
+              <a:rPr lang="es-ES_tradnl" dirty="0" err="1"/>
+              <a:t>is</a:t>
+            </a:r>
+            <a:r>
+              <a:rPr lang="es-ES_tradnl" dirty="0"/>
+              <a:t> </a:t>
+            </a:r>
+            <a:r>
+              <a:rPr lang="es-ES_tradnl" dirty="0" err="1"/>
+              <a:t>an</a:t>
+            </a:r>
+            <a:r>
+              <a:rPr lang="es-ES_tradnl" dirty="0"/>
+              <a:t> </a:t>
+            </a:r>
+            <a:r>
+              <a:rPr lang="es-ES_tradnl" dirty="0" err="1"/>
+              <a:t>effective</a:t>
+            </a:r>
+            <a:r>
+              <a:rPr lang="es-ES_tradnl" dirty="0"/>
+              <a:t> </a:t>
+            </a:r>
+            <a:r>
+              <a:rPr lang="es-ES_tradnl" dirty="0" err="1"/>
+              <a:t>method</a:t>
+            </a:r>
+            <a:r>
+              <a:rPr lang="es-ES_tradnl" dirty="0"/>
+              <a:t> </a:t>
+            </a:r>
+            <a:r>
+              <a:rPr lang="es-ES_tradnl" dirty="0" err="1"/>
+              <a:t>that</a:t>
+            </a:r>
+            <a:r>
+              <a:rPr lang="es-ES_tradnl" dirty="0"/>
+              <a:t> can be </a:t>
+            </a:r>
+            <a:r>
+              <a:rPr lang="es-ES_tradnl" dirty="0" err="1"/>
+              <a:t>expressed</a:t>
+            </a:r>
+            <a:r>
+              <a:rPr lang="es-ES_tradnl" dirty="0"/>
+              <a:t> </a:t>
+            </a:r>
+            <a:r>
+              <a:rPr lang="es-ES_tradnl" dirty="0" err="1"/>
+              <a:t>within</a:t>
+            </a:r>
+            <a:r>
+              <a:rPr lang="es-ES_tradnl" dirty="0"/>
+              <a:t> a </a:t>
+            </a:r>
+            <a:r>
+              <a:rPr lang="es-ES_tradnl" dirty="0" err="1"/>
+              <a:t>finite</a:t>
+            </a:r>
+            <a:r>
+              <a:rPr lang="es-ES_tradnl" dirty="0"/>
+              <a:t> </a:t>
+            </a:r>
+            <a:r>
+              <a:rPr lang="es-ES_tradnl" dirty="0" err="1"/>
+              <a:t>amount</a:t>
+            </a:r>
+            <a:r>
+              <a:rPr lang="es-ES_tradnl" dirty="0"/>
+              <a:t> of </a:t>
+            </a:r>
+            <a:r>
+              <a:rPr lang="es-ES_tradnl" dirty="0" err="1"/>
+              <a:t>space</a:t>
+            </a:r>
+            <a:r>
+              <a:rPr lang="es-ES_tradnl" dirty="0"/>
+              <a:t> and time and in a </a:t>
+            </a:r>
+            <a:r>
+              <a:rPr lang="es-ES_tradnl" dirty="0" err="1"/>
+              <a:t>well-defined</a:t>
+            </a:r>
+            <a:r>
+              <a:rPr lang="es-ES_tradnl" dirty="0"/>
+              <a:t> formal </a:t>
+            </a:r>
+            <a:r>
+              <a:rPr lang="es-ES_tradnl" dirty="0" err="1"/>
+              <a:t>language</a:t>
+            </a:r>
+            <a:r>
+              <a:rPr lang="es-ES_tradnl" dirty="0"/>
+              <a:t> </a:t>
+            </a:r>
+            <a:r>
+              <a:rPr lang="es-ES_tradnl" dirty="0" err="1"/>
+              <a:t>for</a:t>
+            </a:r>
+            <a:r>
+              <a:rPr lang="es-ES_tradnl" dirty="0"/>
+              <a:t> </a:t>
+            </a:r>
+            <a:r>
+              <a:rPr lang="es-ES_tradnl" dirty="0" err="1"/>
+              <a:t>calculating</a:t>
+            </a:r>
+            <a:r>
+              <a:rPr lang="es-ES_tradnl" dirty="0"/>
+              <a:t> a </a:t>
+            </a:r>
+            <a:r>
+              <a:rPr lang="es-ES_tradnl" dirty="0" err="1"/>
+              <a:t>function</a:t>
+            </a:r>
+            <a:r>
+              <a:rPr lang="es-ES_tradnl" dirty="0"/>
+              <a:t>. </a:t>
+            </a:r>
+            <a:r>
+              <a:rPr lang="es-ES_tradnl" dirty="0" err="1"/>
+              <a:t>Starting</a:t>
+            </a:r>
+            <a:r>
+              <a:rPr lang="es-ES_tradnl" dirty="0"/>
+              <a:t> </a:t>
+            </a:r>
+            <a:r>
+              <a:rPr lang="es-ES_tradnl" dirty="0" err="1"/>
+              <a:t>from</a:t>
+            </a:r>
+            <a:r>
+              <a:rPr lang="es-ES_tradnl" dirty="0"/>
+              <a:t> </a:t>
+            </a:r>
+            <a:r>
+              <a:rPr lang="es-ES_tradnl" dirty="0" err="1"/>
+              <a:t>an</a:t>
+            </a:r>
+            <a:r>
+              <a:rPr lang="es-ES_tradnl" dirty="0"/>
+              <a:t> </a:t>
+            </a:r>
+            <a:r>
+              <a:rPr lang="es-ES_tradnl" dirty="0" err="1"/>
+              <a:t>initial</a:t>
+            </a:r>
+            <a:r>
+              <a:rPr lang="es-ES_tradnl" dirty="0"/>
+              <a:t> </a:t>
+            </a:r>
+            <a:r>
+              <a:rPr lang="es-ES_tradnl" dirty="0" err="1"/>
+              <a:t>state</a:t>
+            </a:r>
+            <a:r>
+              <a:rPr lang="es-ES_tradnl" dirty="0"/>
+              <a:t> and </a:t>
+            </a:r>
+            <a:r>
+              <a:rPr lang="es-ES_tradnl" dirty="0" err="1"/>
+              <a:t>initial</a:t>
+            </a:r>
+            <a:r>
+              <a:rPr lang="es-ES_tradnl" dirty="0"/>
+              <a:t> input (</a:t>
+            </a:r>
+            <a:r>
+              <a:rPr lang="es-ES_tradnl" dirty="0" err="1"/>
+              <a:t>perhaps</a:t>
+            </a:r>
+            <a:r>
+              <a:rPr lang="es-ES_tradnl" dirty="0"/>
+              <a:t> </a:t>
+            </a:r>
+            <a:r>
+              <a:rPr lang="es-ES_tradnl" dirty="0" err="1"/>
+              <a:t>empty</a:t>
+            </a:r>
+            <a:r>
+              <a:rPr lang="es-ES_tradnl" dirty="0"/>
+              <a:t>), </a:t>
+            </a:r>
+            <a:r>
+              <a:rPr lang="es-ES_tradnl" dirty="0" err="1"/>
+              <a:t>the</a:t>
+            </a:r>
+            <a:r>
+              <a:rPr lang="es-ES_tradnl" dirty="0"/>
+              <a:t> </a:t>
+            </a:r>
+            <a:r>
+              <a:rPr lang="es-ES_tradnl" dirty="0" err="1"/>
+              <a:t>instructions</a:t>
+            </a:r>
+            <a:r>
+              <a:rPr lang="es-ES_tradnl" dirty="0"/>
+              <a:t> describe a </a:t>
+            </a:r>
+            <a:r>
+              <a:rPr lang="es-ES_tradnl" dirty="0" err="1"/>
+              <a:t>computation</a:t>
+            </a:r>
+            <a:r>
+              <a:rPr lang="es-ES_tradnl" dirty="0"/>
+              <a:t> </a:t>
+            </a:r>
+            <a:r>
+              <a:rPr lang="es-ES_tradnl" dirty="0" err="1"/>
+              <a:t>that</a:t>
+            </a:r>
+            <a:r>
+              <a:rPr lang="es-ES_tradnl" dirty="0"/>
+              <a:t>, </a:t>
+            </a:r>
+            <a:r>
+              <a:rPr lang="es-ES_tradnl" dirty="0" err="1"/>
+              <a:t>when</a:t>
+            </a:r>
+            <a:r>
+              <a:rPr lang="es-ES_tradnl" dirty="0"/>
+              <a:t> </a:t>
+            </a:r>
+            <a:r>
+              <a:rPr lang="es-ES_tradnl" dirty="0" err="1"/>
+              <a:t>executed</a:t>
+            </a:r>
+            <a:r>
+              <a:rPr lang="es-ES_tradnl" dirty="0"/>
+              <a:t>, </a:t>
+            </a:r>
+            <a:r>
+              <a:rPr lang="es-ES_tradnl" dirty="0" err="1"/>
+              <a:t>proceeds</a:t>
+            </a:r>
+            <a:r>
+              <a:rPr lang="es-ES_tradnl" dirty="0"/>
+              <a:t> </a:t>
+            </a:r>
+            <a:r>
+              <a:rPr lang="es-ES_tradnl" dirty="0" err="1"/>
+              <a:t>through</a:t>
+            </a:r>
+            <a:r>
+              <a:rPr lang="es-ES_tradnl" dirty="0"/>
+              <a:t> a </a:t>
+            </a:r>
+            <a:r>
+              <a:rPr lang="es-ES_tradnl" dirty="0" err="1"/>
+              <a:t>finite</a:t>
+            </a:r>
+            <a:r>
+              <a:rPr lang="es-ES_tradnl" dirty="0"/>
+              <a:t> </a:t>
+            </a:r>
+            <a:r>
+              <a:rPr lang="es-ES_tradnl" dirty="0" err="1"/>
+              <a:t>number</a:t>
+            </a:r>
+            <a:r>
+              <a:rPr lang="es-ES_tradnl" dirty="0"/>
+              <a:t> of </a:t>
+            </a:r>
+            <a:r>
+              <a:rPr lang="es-ES_tradnl" dirty="0" err="1"/>
+              <a:t>well-defined</a:t>
+            </a:r>
+            <a:r>
+              <a:rPr lang="es-ES_tradnl" dirty="0"/>
+              <a:t> </a:t>
+            </a:r>
+            <a:r>
+              <a:rPr lang="es-ES_tradnl" dirty="0" err="1"/>
+              <a:t>successive</a:t>
+            </a:r>
+            <a:r>
+              <a:rPr lang="es-ES_tradnl" dirty="0"/>
+              <a:t> </a:t>
+            </a:r>
+            <a:r>
+              <a:rPr lang="es-ES_tradnl" dirty="0" err="1"/>
+              <a:t>states</a:t>
+            </a:r>
+            <a:r>
+              <a:rPr lang="es-ES_tradnl" dirty="0"/>
+              <a:t>, </a:t>
+            </a:r>
+            <a:r>
+              <a:rPr lang="es-ES_tradnl" dirty="0" err="1"/>
+              <a:t>eventually</a:t>
+            </a:r>
+            <a:r>
+              <a:rPr lang="es-ES_tradnl" dirty="0"/>
+              <a:t> </a:t>
+            </a:r>
+            <a:r>
+              <a:rPr lang="es-ES_tradnl" dirty="0" err="1"/>
+              <a:t>producing</a:t>
+            </a:r>
+            <a:r>
+              <a:rPr lang="es-ES_tradnl" dirty="0"/>
+              <a:t> "output" and </a:t>
+            </a:r>
+            <a:r>
+              <a:rPr lang="es-ES_tradnl" dirty="0" err="1"/>
+              <a:t>terminating</a:t>
+            </a:r>
+            <a:r>
+              <a:rPr lang="es-ES_tradnl" dirty="0"/>
+              <a:t> at a final </a:t>
+            </a:r>
+            <a:r>
+              <a:rPr lang="es-ES_tradnl" dirty="0" err="1"/>
+              <a:t>ending</a:t>
+            </a:r>
+            <a:r>
+              <a:rPr lang="es-ES_tradnl" dirty="0"/>
+              <a:t> </a:t>
+            </a:r>
+            <a:r>
+              <a:rPr lang="es-ES_tradnl" dirty="0" err="1"/>
+              <a:t>state</a:t>
+            </a:r>
+            <a:r>
+              <a:rPr lang="es-ES_tradnl" dirty="0"/>
+              <a:t>. .” Fuente: W</a:t>
+            </a:r>
+            <a:r>
+              <a:rPr lang="es-ES_tradnl" dirty="0" smtClean="0"/>
+              <a:t>ikipedia </a:t>
+            </a:r>
+            <a:endParaRPr lang="es-ES_tradnl" dirty="0"/>
+          </a:p>
+        </p:txBody>
+      </p:sp>
+    </p:spTree>
+    <p:extLst>
+      <p:ext uri="{BB962C8B-B14F-4D97-AF65-F5344CB8AC3E}">
+        <p14:creationId xmlns:p14="http://schemas.microsoft.com/office/powerpoint/2010/main" val="441366653"/>
+      </p:ext>
+    </p:extLst>
+  </p:cSld>
+  <p:clrMapOvr>
+    <a:masterClrMapping/>
+  </p:clrMapOvr>
+</p:sld>
+</file>
+
+<file path=ppt/slides/slide19.xml><?xml version="1.0" encoding="utf-8"?>
+<p:sld xmlns:a="http://schemas.openxmlformats.org/drawingml/2006/main" xmlns:r="http://schemas.openxmlformats.org/officeDocument/2006/relationships" xmlns:p="http://schemas.openxmlformats.org/presentationml/2006/main">
+  <p:cSld>
+    <p:spTree>
+      <p:nvGrpSpPr>
+        <p:cNvPr id="1" name=""/>
+        <p:cNvGrpSpPr/>
+        <p:nvPr/>
+      </p:nvGrpSpPr>
+      <p:grpSpPr>
+        <a:xfrm>
+          <a:off x="0" y="0"/>
+          <a:ext cx="0" cy="0"/>
+          <a:chOff x="0" y="0"/>
+          <a:chExt cx="0" cy="0"/>
+        </a:xfrm>
+      </p:grpSpPr>
+      <p:sp>
+        <p:nvSpPr>
+          <p:cNvPr id="2" name="Title 1"/>
+          <p:cNvSpPr>
+            <a:spLocks noGrp="1"/>
+          </p:cNvSpPr>
+          <p:nvPr>
+            <p:ph type="title"/>
+          </p:nvPr>
+        </p:nvSpPr>
+        <p:spPr/>
+        <p:txBody>
+          <a:bodyPr/>
+          <a:lstStyle/>
+          <a:p>
+            <a:r>
+              <a:rPr lang="es-ES_tradnl" dirty="0" smtClean="0"/>
+              <a:t>Big O </a:t>
+            </a:r>
+            <a:r>
+              <a:rPr lang="es-ES_tradnl" dirty="0" err="1" smtClean="0"/>
+              <a:t>notation</a:t>
+            </a:r>
+            <a:endParaRPr lang="es-ES_tradnl" dirty="0"/>
+          </a:p>
+        </p:txBody>
+      </p:sp>
+      <p:sp>
+        <p:nvSpPr>
+          <p:cNvPr id="3" name="Content Placeholder 2"/>
+          <p:cNvSpPr>
+            <a:spLocks noGrp="1"/>
+          </p:cNvSpPr>
+          <p:nvPr>
+            <p:ph idx="1"/>
+          </p:nvPr>
+        </p:nvSpPr>
+        <p:spPr>
+          <a:xfrm>
+            <a:off x="677334" y="2160590"/>
+            <a:ext cx="8596668" cy="854074"/>
+          </a:xfrm>
+        </p:spPr>
+        <p:txBody>
+          <a:bodyPr/>
+          <a:lstStyle/>
+          <a:p>
+            <a:pPr marL="0" marR="0" lvl="0" indent="0" algn="ctr" defTabSz="914400" eaLnBrk="1" fontAlgn="auto" latinLnBrk="0" hangingPunct="1">
+              <a:lnSpc>
+                <a:spcPct val="100000"/>
+              </a:lnSpc>
+              <a:spcBef>
+                <a:spcPts val="0"/>
+              </a:spcBef>
+              <a:spcAft>
+                <a:spcPts val="0"/>
+              </a:spcAft>
+              <a:buClrTx/>
+              <a:buSzTx/>
+              <a:buFontTx/>
+              <a:buNone/>
+              <a:tabLst/>
+              <a:defRPr/>
+            </a:pPr>
+            <a:r>
+              <a:rPr lang="es-ES_tradnl" dirty="0" smtClean="0"/>
+              <a:t>“Es una notación que se utiliza para analizar la complejidad de un algoritmo en función de los recursos de cómputo y de memoria que podría utilizar.”</a:t>
+            </a:r>
+          </a:p>
+          <a:p>
+            <a:pPr marL="0" marR="0" lvl="0" indent="0" algn="ctr" defTabSz="914400" eaLnBrk="1" fontAlgn="auto" latinLnBrk="0" hangingPunct="1">
+              <a:lnSpc>
+                <a:spcPct val="100000"/>
+              </a:lnSpc>
+              <a:spcBef>
+                <a:spcPts val="0"/>
+              </a:spcBef>
+              <a:spcAft>
+                <a:spcPts val="0"/>
+              </a:spcAft>
+              <a:buClrTx/>
+              <a:buSzTx/>
+              <a:buFontTx/>
+              <a:buNone/>
+              <a:tabLst/>
+              <a:defRPr/>
+            </a:pPr>
+            <a:endParaRPr lang="es-ES_tradnl" dirty="0"/>
+          </a:p>
+          <a:p>
+            <a:pPr marL="0" marR="0" lvl="0" indent="0" algn="ctr" defTabSz="914400" eaLnBrk="1" fontAlgn="auto" latinLnBrk="0" hangingPunct="1">
+              <a:lnSpc>
+                <a:spcPct val="100000"/>
+              </a:lnSpc>
+              <a:spcBef>
+                <a:spcPts val="0"/>
+              </a:spcBef>
+              <a:spcAft>
+                <a:spcPts val="0"/>
+              </a:spcAft>
+              <a:buClrTx/>
+              <a:buSzTx/>
+              <a:buFontTx/>
+              <a:buNone/>
+              <a:tabLst/>
+              <a:defRPr/>
+            </a:pPr>
+            <a:endParaRPr lang="es-ES_tradnl" dirty="0" smtClean="0"/>
+          </a:p>
+          <a:p>
+            <a:pPr marL="0" marR="0" lvl="0" indent="0" algn="ctr" defTabSz="914400" eaLnBrk="1" fontAlgn="auto" latinLnBrk="0" hangingPunct="1">
+              <a:lnSpc>
+                <a:spcPct val="100000"/>
+              </a:lnSpc>
+              <a:spcBef>
+                <a:spcPts val="0"/>
+              </a:spcBef>
+              <a:spcAft>
+                <a:spcPts val="0"/>
+              </a:spcAft>
+              <a:buClrTx/>
+              <a:buSzTx/>
+              <a:buFontTx/>
+              <a:buNone/>
+              <a:tabLst/>
+              <a:defRPr/>
+            </a:pPr>
+            <a:endParaRPr lang="es-ES_tradnl" dirty="0" smtClean="0"/>
+          </a:p>
+          <a:p>
+            <a:pPr marL="0" marR="0" lvl="0" indent="0" defTabSz="914400" eaLnBrk="1" fontAlgn="auto" latinLnBrk="0" hangingPunct="1">
+              <a:lnSpc>
+                <a:spcPct val="100000"/>
+              </a:lnSpc>
+              <a:spcBef>
+                <a:spcPts val="0"/>
+              </a:spcBef>
+              <a:spcAft>
+                <a:spcPts val="0"/>
+              </a:spcAft>
+              <a:buClrTx/>
+              <a:buSzTx/>
+              <a:buFontTx/>
+              <a:buNone/>
+              <a:tabLst/>
+              <a:defRPr/>
+            </a:pPr>
+            <a:endParaRPr lang="es-ES_tradnl" dirty="0"/>
+          </a:p>
+          <a:p>
+            <a:pPr marL="0" marR="0" lvl="0" indent="0" defTabSz="914400" eaLnBrk="1" fontAlgn="auto" latinLnBrk="0" hangingPunct="1">
+              <a:lnSpc>
+                <a:spcPct val="100000"/>
+              </a:lnSpc>
+              <a:spcBef>
+                <a:spcPts val="0"/>
+              </a:spcBef>
+              <a:spcAft>
+                <a:spcPts val="0"/>
+              </a:spcAft>
+              <a:buClrTx/>
+              <a:buSzTx/>
+              <a:buFontTx/>
+              <a:buNone/>
+              <a:tabLst/>
+              <a:defRPr/>
+            </a:pPr>
+            <a:endParaRPr lang="es-ES_tradnl" dirty="0"/>
+          </a:p>
+        </p:txBody>
+      </p:sp>
+      <p:sp>
+        <p:nvSpPr>
+          <p:cNvPr id="4" name="Content Placeholder 2"/>
+          <p:cNvSpPr txBox="1">
+            <a:spLocks/>
+          </p:cNvSpPr>
+          <p:nvPr/>
+        </p:nvSpPr>
+        <p:spPr>
+          <a:xfrm>
+            <a:off x="448734" y="3228181"/>
+            <a:ext cx="8596668" cy="427034"/>
+          </a:xfrm>
+          <a:prstGeom prst="rect">
+            <a:avLst/>
+          </a:prstGeom>
+        </p:spPr>
+        <p:txBody>
+          <a:bodyPr vert="horz" lIns="91440" tIns="45720" rIns="91440" bIns="45720" rtlCol="0">
+            <a:normAutofit/>
+          </a:bodyPr>
+          <a:lstStyle>
+            <a:lvl1pPr marL="342900" indent="-342900" algn="l" defTabSz="457200" rtl="0" eaLnBrk="1" latinLnBrk="0" hangingPunct="1">
+              <a:spcBef>
+                <a:spcPts val="1000"/>
+              </a:spcBef>
+              <a:spcAft>
+                <a:spcPts val="0"/>
+              </a:spcAft>
+              <a:buClr>
+                <a:schemeClr val="accent1"/>
+              </a:buClr>
+              <a:buSzPct val="80000"/>
+              <a:buFont typeface="Wingdings 3" charset="2"/>
+              <a:buChar char=""/>
+              <a:defRPr sz="1800" kern="1200">
+                <a:solidFill>
+                  <a:schemeClr val="tx1">
+                    <a:lumMod val="75000"/>
+                    <a:lumOff val="25000"/>
+                  </a:schemeClr>
+                </a:solidFill>
+                <a:latin typeface="+mn-lt"/>
+                <a:ea typeface="+mn-ea"/>
+                <a:cs typeface="+mn-cs"/>
+              </a:defRPr>
+            </a:lvl1pPr>
+            <a:lvl2pPr marL="742950" indent="-285750" algn="l" defTabSz="457200" rtl="0" eaLnBrk="1" latinLnBrk="0" hangingPunct="1">
+              <a:spcBef>
+                <a:spcPts val="1000"/>
+              </a:spcBef>
+              <a:spcAft>
+                <a:spcPts val="0"/>
+              </a:spcAft>
+              <a:buClr>
+                <a:schemeClr val="accent1"/>
+              </a:buClr>
+              <a:buSzPct val="80000"/>
+              <a:buFont typeface="Wingdings 3" charset="2"/>
+              <a:buChar char=""/>
+              <a:defRPr sz="1600" kern="1200">
+                <a:solidFill>
+                  <a:schemeClr val="tx1">
+                    <a:lumMod val="75000"/>
+                    <a:lumOff val="25000"/>
+                  </a:schemeClr>
+                </a:solidFill>
+                <a:latin typeface="+mn-lt"/>
+                <a:ea typeface="+mn-ea"/>
+                <a:cs typeface="+mn-cs"/>
+              </a:defRPr>
+            </a:lvl2pPr>
+            <a:lvl3pPr marL="1143000" indent="-228600" algn="l" defTabSz="457200" rtl="0" eaLnBrk="1" latinLnBrk="0" hangingPunct="1">
+              <a:spcBef>
+                <a:spcPts val="1000"/>
+              </a:spcBef>
+              <a:spcAft>
+                <a:spcPts val="0"/>
+              </a:spcAft>
+              <a:buClr>
+                <a:schemeClr val="accent1"/>
+              </a:buClr>
+              <a:buSzPct val="80000"/>
+              <a:buFont typeface="Wingdings 3" charset="2"/>
+              <a:buChar char=""/>
+              <a:defRPr sz="1400" kern="1200">
+                <a:solidFill>
+                  <a:schemeClr val="tx1">
+                    <a:lumMod val="75000"/>
+                    <a:lumOff val="25000"/>
+                  </a:schemeClr>
+                </a:solidFill>
+                <a:latin typeface="+mn-lt"/>
+                <a:ea typeface="+mn-ea"/>
+                <a:cs typeface="+mn-cs"/>
+              </a:defRPr>
+            </a:lvl3pPr>
+            <a:lvl4pPr marL="1600200" indent="-228600" algn="l" defTabSz="457200" rtl="0" eaLnBrk="1" latinLnBrk="0" hangingPunct="1">
+              <a:spcBef>
+                <a:spcPts val="1000"/>
+              </a:spcBef>
+              <a:spcAft>
+                <a:spcPts val="0"/>
+              </a:spcAft>
+              <a:buClr>
+                <a:schemeClr val="accent1"/>
+              </a:buClr>
+              <a:buSzPct val="80000"/>
+              <a:buFont typeface="Wingdings 3" charset="2"/>
+              <a:buChar char=""/>
+              <a:defRPr sz="1200" kern="1200">
+                <a:solidFill>
+                  <a:schemeClr val="tx1">
+                    <a:lumMod val="75000"/>
+                    <a:lumOff val="25000"/>
+                  </a:schemeClr>
+                </a:solidFill>
+                <a:latin typeface="+mn-lt"/>
+                <a:ea typeface="+mn-ea"/>
+                <a:cs typeface="+mn-cs"/>
+              </a:defRPr>
+            </a:lvl4pPr>
+            <a:lvl5pPr marL="2057400" indent="-228600" algn="l" defTabSz="457200" rtl="0" eaLnBrk="1" latinLnBrk="0" hangingPunct="1">
+              <a:spcBef>
+                <a:spcPts val="1000"/>
+              </a:spcBef>
+              <a:spcAft>
+                <a:spcPts val="0"/>
+              </a:spcAft>
+              <a:buClr>
+                <a:schemeClr val="accent1"/>
+              </a:buClr>
+              <a:buSzPct val="80000"/>
+              <a:buFont typeface="Wingdings 3" charset="2"/>
+              <a:buChar char=""/>
+              <a:defRPr sz="1200" kern="1200">
+                <a:solidFill>
+                  <a:schemeClr val="tx1">
+                    <a:lumMod val="75000"/>
+                    <a:lumOff val="25000"/>
+                  </a:schemeClr>
+                </a:solidFill>
+                <a:latin typeface="+mn-lt"/>
+                <a:ea typeface="+mn-ea"/>
+                <a:cs typeface="+mn-cs"/>
+              </a:defRPr>
+            </a:lvl5pPr>
+            <a:lvl6pPr marL="2514600" indent="-228600" algn="l" defTabSz="457200" rtl="0" eaLnBrk="1" latinLnBrk="0" hangingPunct="1">
+              <a:spcBef>
+                <a:spcPts val="1000"/>
+              </a:spcBef>
+              <a:spcAft>
+                <a:spcPts val="0"/>
+              </a:spcAft>
+              <a:buClr>
+                <a:schemeClr val="accent1"/>
+              </a:buClr>
+              <a:buSzPct val="80000"/>
+              <a:buFont typeface="Wingdings 3" charset="2"/>
+              <a:buChar char=""/>
+              <a:defRPr sz="1200" kern="1200">
+                <a:solidFill>
+                  <a:schemeClr val="tx1">
+                    <a:lumMod val="75000"/>
+                    <a:lumOff val="25000"/>
+                  </a:schemeClr>
+                </a:solidFill>
+                <a:latin typeface="+mn-lt"/>
+                <a:ea typeface="+mn-ea"/>
+                <a:cs typeface="+mn-cs"/>
+              </a:defRPr>
+            </a:lvl6pPr>
+            <a:lvl7pPr marL="2971800" indent="-228600" algn="l" defTabSz="457200" rtl="0" eaLnBrk="1" latinLnBrk="0" hangingPunct="1">
+              <a:spcBef>
+                <a:spcPts val="1000"/>
+              </a:spcBef>
+              <a:spcAft>
+                <a:spcPts val="0"/>
+              </a:spcAft>
+              <a:buClr>
+                <a:schemeClr val="accent1"/>
+              </a:buClr>
+              <a:buSzPct val="80000"/>
+              <a:buFont typeface="Wingdings 3" charset="2"/>
+              <a:buChar char=""/>
+              <a:defRPr sz="1200" kern="1200">
+                <a:solidFill>
+                  <a:schemeClr val="tx1">
+                    <a:lumMod val="75000"/>
+                    <a:lumOff val="25000"/>
+                  </a:schemeClr>
+                </a:solidFill>
+                <a:latin typeface="+mn-lt"/>
+                <a:ea typeface="+mn-ea"/>
+                <a:cs typeface="+mn-cs"/>
+              </a:defRPr>
+            </a:lvl7pPr>
+            <a:lvl8pPr marL="3429000" indent="-228600" algn="l" defTabSz="457200" rtl="0" eaLnBrk="1" latinLnBrk="0" hangingPunct="1">
+              <a:spcBef>
+                <a:spcPts val="1000"/>
+              </a:spcBef>
+              <a:spcAft>
+                <a:spcPts val="0"/>
+              </a:spcAft>
+              <a:buClr>
+                <a:schemeClr val="accent1"/>
+              </a:buClr>
+              <a:buSzPct val="80000"/>
+              <a:buFont typeface="Wingdings 3" charset="2"/>
+              <a:buChar char=""/>
+              <a:defRPr sz="1200" kern="1200">
+                <a:solidFill>
+                  <a:schemeClr val="tx1">
+                    <a:lumMod val="75000"/>
+                    <a:lumOff val="25000"/>
+                  </a:schemeClr>
+                </a:solidFill>
+                <a:latin typeface="+mn-lt"/>
+                <a:ea typeface="+mn-ea"/>
+                <a:cs typeface="+mn-cs"/>
+              </a:defRPr>
+            </a:lvl8pPr>
+            <a:lvl9pPr marL="3886200" indent="-228600" algn="l" defTabSz="457200" rtl="0" eaLnBrk="1" latinLnBrk="0" hangingPunct="1">
+              <a:spcBef>
+                <a:spcPts val="1000"/>
+              </a:spcBef>
+              <a:spcAft>
+                <a:spcPts val="0"/>
+              </a:spcAft>
+              <a:buClr>
+                <a:schemeClr val="accent1"/>
+              </a:buClr>
+              <a:buSzPct val="80000"/>
+              <a:buFont typeface="Wingdings 3" charset="2"/>
+              <a:buChar char=""/>
+              <a:defRPr sz="1200" kern="1200">
+                <a:solidFill>
+                  <a:schemeClr val="tx1">
+                    <a:lumMod val="75000"/>
+                    <a:lumOff val="25000"/>
+                  </a:schemeClr>
+                </a:solidFill>
+                <a:latin typeface="+mn-lt"/>
+                <a:ea typeface="+mn-ea"/>
+                <a:cs typeface="+mn-cs"/>
+              </a:defRPr>
+            </a:lvl9pPr>
+          </a:lstStyle>
+          <a:p>
+            <a:pPr marL="0" indent="0" algn="ctr" defTabSz="914400">
+              <a:spcBef>
+                <a:spcPts val="0"/>
+              </a:spcBef>
+              <a:buClrTx/>
+              <a:buSzTx/>
+              <a:buFontTx/>
+              <a:buNone/>
+            </a:pPr>
+            <a:r>
+              <a:rPr lang="es-ES_tradnl" b="1" i="1" dirty="0" smtClean="0"/>
+              <a:t>O(n) -&gt; k * n = número de pasos requeridos.</a:t>
+            </a:r>
+          </a:p>
+          <a:p>
+            <a:pPr marL="0" indent="0" algn="ctr" defTabSz="914400">
+              <a:spcBef>
+                <a:spcPts val="0"/>
+              </a:spcBef>
+              <a:buClrTx/>
+              <a:buSzTx/>
+              <a:buFontTx/>
+              <a:buNone/>
+            </a:pPr>
+            <a:endParaRPr lang="es-ES_tradnl" dirty="0" smtClean="0"/>
+          </a:p>
+          <a:p>
+            <a:pPr marL="0" indent="0" algn="ctr" defTabSz="914400">
+              <a:spcBef>
+                <a:spcPts val="0"/>
+              </a:spcBef>
+              <a:buClrTx/>
+              <a:buSzTx/>
+              <a:buFontTx/>
+              <a:buNone/>
+            </a:pPr>
+            <a:endParaRPr lang="es-ES_tradnl" dirty="0" smtClean="0"/>
+          </a:p>
+          <a:p>
+            <a:pPr marL="0" indent="0" algn="ctr" defTabSz="914400">
+              <a:spcBef>
+                <a:spcPts val="0"/>
+              </a:spcBef>
+              <a:buClrTx/>
+              <a:buSzTx/>
+              <a:buFontTx/>
+              <a:buNone/>
+            </a:pPr>
+            <a:endParaRPr lang="es-ES_tradnl" dirty="0" smtClean="0"/>
+          </a:p>
+          <a:p>
+            <a:pPr marL="0" indent="0" defTabSz="914400">
+              <a:spcBef>
+                <a:spcPts val="0"/>
+              </a:spcBef>
+              <a:buClrTx/>
+              <a:buSzTx/>
+              <a:buFontTx/>
+              <a:buNone/>
+            </a:pPr>
+            <a:endParaRPr lang="es-ES_tradnl" dirty="0" smtClean="0"/>
+          </a:p>
+          <a:p>
+            <a:pPr marL="0" indent="0" defTabSz="914400">
+              <a:spcBef>
+                <a:spcPts val="0"/>
+              </a:spcBef>
+              <a:buClrTx/>
+              <a:buSzTx/>
+              <a:buFontTx/>
+              <a:buNone/>
+            </a:pPr>
+            <a:endParaRPr lang="es-ES_tradnl" dirty="0"/>
+          </a:p>
+        </p:txBody>
+      </p:sp>
+      <p:sp>
+        <p:nvSpPr>
+          <p:cNvPr id="5" name="Content Placeholder 2"/>
+          <p:cNvSpPr txBox="1">
+            <a:spLocks/>
+          </p:cNvSpPr>
+          <p:nvPr/>
+        </p:nvSpPr>
+        <p:spPr>
+          <a:xfrm>
+            <a:off x="548747" y="3688561"/>
+            <a:ext cx="8596668" cy="427034"/>
+          </a:xfrm>
+          <a:prstGeom prst="rect">
+            <a:avLst/>
+          </a:prstGeom>
+        </p:spPr>
+        <p:txBody>
+          <a:bodyPr vert="horz" lIns="91440" tIns="45720" rIns="91440" bIns="45720" rtlCol="0">
+            <a:normAutofit/>
+          </a:bodyPr>
+          <a:lstStyle>
+            <a:lvl1pPr marL="342900" indent="-342900" algn="l" defTabSz="457200" rtl="0" eaLnBrk="1" latinLnBrk="0" hangingPunct="1">
+              <a:spcBef>
+                <a:spcPts val="1000"/>
+              </a:spcBef>
+              <a:spcAft>
+                <a:spcPts val="0"/>
+              </a:spcAft>
+              <a:buClr>
+                <a:schemeClr val="accent1"/>
+              </a:buClr>
+              <a:buSzPct val="80000"/>
+              <a:buFont typeface="Wingdings 3" charset="2"/>
+              <a:buChar char=""/>
+              <a:defRPr sz="1800" kern="1200">
+                <a:solidFill>
+                  <a:schemeClr val="tx1">
+                    <a:lumMod val="75000"/>
+                    <a:lumOff val="25000"/>
+                  </a:schemeClr>
+                </a:solidFill>
+                <a:latin typeface="+mn-lt"/>
+                <a:ea typeface="+mn-ea"/>
+                <a:cs typeface="+mn-cs"/>
+              </a:defRPr>
+            </a:lvl1pPr>
+            <a:lvl2pPr marL="742950" indent="-285750" algn="l" defTabSz="457200" rtl="0" eaLnBrk="1" latinLnBrk="0" hangingPunct="1">
+              <a:spcBef>
+                <a:spcPts val="1000"/>
+              </a:spcBef>
+              <a:spcAft>
+                <a:spcPts val="0"/>
+              </a:spcAft>
+              <a:buClr>
+                <a:schemeClr val="accent1"/>
+              </a:buClr>
+              <a:buSzPct val="80000"/>
+              <a:buFont typeface="Wingdings 3" charset="2"/>
+              <a:buChar char=""/>
+              <a:defRPr sz="1600" kern="1200">
+                <a:solidFill>
+                  <a:schemeClr val="tx1">
+                    <a:lumMod val="75000"/>
+                    <a:lumOff val="25000"/>
+                  </a:schemeClr>
+                </a:solidFill>
+                <a:latin typeface="+mn-lt"/>
+                <a:ea typeface="+mn-ea"/>
+                <a:cs typeface="+mn-cs"/>
+              </a:defRPr>
+            </a:lvl2pPr>
+            <a:lvl3pPr marL="1143000" indent="-228600" algn="l" defTabSz="457200" rtl="0" eaLnBrk="1" latinLnBrk="0" hangingPunct="1">
+              <a:spcBef>
+                <a:spcPts val="1000"/>
+              </a:spcBef>
+              <a:spcAft>
+                <a:spcPts val="0"/>
+              </a:spcAft>
+              <a:buClr>
+                <a:schemeClr val="accent1"/>
+              </a:buClr>
+              <a:buSzPct val="80000"/>
+              <a:buFont typeface="Wingdings 3" charset="2"/>
+              <a:buChar char=""/>
+              <a:defRPr sz="1400" kern="1200">
+                <a:solidFill>
+                  <a:schemeClr val="tx1">
+                    <a:lumMod val="75000"/>
+                    <a:lumOff val="25000"/>
+                  </a:schemeClr>
+                </a:solidFill>
+                <a:latin typeface="+mn-lt"/>
+                <a:ea typeface="+mn-ea"/>
+                <a:cs typeface="+mn-cs"/>
+              </a:defRPr>
+            </a:lvl3pPr>
+            <a:lvl4pPr marL="1600200" indent="-228600" algn="l" defTabSz="457200" rtl="0" eaLnBrk="1" latinLnBrk="0" hangingPunct="1">
+              <a:spcBef>
+                <a:spcPts val="1000"/>
+              </a:spcBef>
+              <a:spcAft>
+                <a:spcPts val="0"/>
+              </a:spcAft>
+              <a:buClr>
+                <a:schemeClr val="accent1"/>
+              </a:buClr>
+              <a:buSzPct val="80000"/>
+              <a:buFont typeface="Wingdings 3" charset="2"/>
+              <a:buChar char=""/>
+              <a:defRPr sz="1200" kern="1200">
+                <a:solidFill>
+                  <a:schemeClr val="tx1">
+                    <a:lumMod val="75000"/>
+                    <a:lumOff val="25000"/>
+                  </a:schemeClr>
+                </a:solidFill>
+                <a:latin typeface="+mn-lt"/>
+                <a:ea typeface="+mn-ea"/>
+                <a:cs typeface="+mn-cs"/>
+              </a:defRPr>
+            </a:lvl4pPr>
+            <a:lvl5pPr marL="2057400" indent="-228600" algn="l" defTabSz="457200" rtl="0" eaLnBrk="1" latinLnBrk="0" hangingPunct="1">
+              <a:spcBef>
+                <a:spcPts val="1000"/>
+              </a:spcBef>
+              <a:spcAft>
+                <a:spcPts val="0"/>
+              </a:spcAft>
+              <a:buClr>
+                <a:schemeClr val="accent1"/>
+              </a:buClr>
+              <a:buSzPct val="80000"/>
+              <a:buFont typeface="Wingdings 3" charset="2"/>
+              <a:buChar char=""/>
+              <a:defRPr sz="1200" kern="1200">
+                <a:solidFill>
+                  <a:schemeClr val="tx1">
+                    <a:lumMod val="75000"/>
+                    <a:lumOff val="25000"/>
+                  </a:schemeClr>
+                </a:solidFill>
+                <a:latin typeface="+mn-lt"/>
+                <a:ea typeface="+mn-ea"/>
+                <a:cs typeface="+mn-cs"/>
+              </a:defRPr>
+            </a:lvl5pPr>
+            <a:lvl6pPr marL="2514600" indent="-228600" algn="l" defTabSz="457200" rtl="0" eaLnBrk="1" latinLnBrk="0" hangingPunct="1">
+              <a:spcBef>
+                <a:spcPts val="1000"/>
+              </a:spcBef>
+              <a:spcAft>
+                <a:spcPts val="0"/>
+              </a:spcAft>
+              <a:buClr>
+                <a:schemeClr val="accent1"/>
+              </a:buClr>
+              <a:buSzPct val="80000"/>
+              <a:buFont typeface="Wingdings 3" charset="2"/>
+              <a:buChar char=""/>
+              <a:defRPr sz="1200" kern="1200">
+                <a:solidFill>
+                  <a:schemeClr val="tx1">
+                    <a:lumMod val="75000"/>
+                    <a:lumOff val="25000"/>
+                  </a:schemeClr>
+                </a:solidFill>
+                <a:latin typeface="+mn-lt"/>
+                <a:ea typeface="+mn-ea"/>
+                <a:cs typeface="+mn-cs"/>
+              </a:defRPr>
+            </a:lvl6pPr>
+            <a:lvl7pPr marL="2971800" indent="-228600" algn="l" defTabSz="457200" rtl="0" eaLnBrk="1" latinLnBrk="0" hangingPunct="1">
+              <a:spcBef>
+                <a:spcPts val="1000"/>
+              </a:spcBef>
+              <a:spcAft>
+                <a:spcPts val="0"/>
+              </a:spcAft>
+              <a:buClr>
+                <a:schemeClr val="accent1"/>
+              </a:buClr>
+              <a:buSzPct val="80000"/>
+              <a:buFont typeface="Wingdings 3" charset="2"/>
+              <a:buChar char=""/>
+              <a:defRPr sz="1200" kern="1200">
+                <a:solidFill>
+                  <a:schemeClr val="tx1">
+                    <a:lumMod val="75000"/>
+                    <a:lumOff val="25000"/>
+                  </a:schemeClr>
+                </a:solidFill>
+                <a:latin typeface="+mn-lt"/>
+                <a:ea typeface="+mn-ea"/>
+                <a:cs typeface="+mn-cs"/>
+              </a:defRPr>
+            </a:lvl7pPr>
+            <a:lvl8pPr marL="3429000" indent="-228600" algn="l" defTabSz="457200" rtl="0" eaLnBrk="1" latinLnBrk="0" hangingPunct="1">
+              <a:spcBef>
+                <a:spcPts val="1000"/>
+              </a:spcBef>
+              <a:spcAft>
+                <a:spcPts val="0"/>
+              </a:spcAft>
+              <a:buClr>
+                <a:schemeClr val="accent1"/>
+              </a:buClr>
+              <a:buSzPct val="80000"/>
+              <a:buFont typeface="Wingdings 3" charset="2"/>
+              <a:buChar char=""/>
+              <a:defRPr sz="1200" kern="1200">
+                <a:solidFill>
+                  <a:schemeClr val="tx1">
+                    <a:lumMod val="75000"/>
+                    <a:lumOff val="25000"/>
+                  </a:schemeClr>
+                </a:solidFill>
+                <a:latin typeface="+mn-lt"/>
+                <a:ea typeface="+mn-ea"/>
+                <a:cs typeface="+mn-cs"/>
+              </a:defRPr>
+            </a:lvl8pPr>
+            <a:lvl9pPr marL="3886200" indent="-228600" algn="l" defTabSz="457200" rtl="0" eaLnBrk="1" latinLnBrk="0" hangingPunct="1">
+              <a:spcBef>
+                <a:spcPts val="1000"/>
+              </a:spcBef>
+              <a:spcAft>
+                <a:spcPts val="0"/>
+              </a:spcAft>
+              <a:buClr>
+                <a:schemeClr val="accent1"/>
+              </a:buClr>
+              <a:buSzPct val="80000"/>
+              <a:buFont typeface="Wingdings 3" charset="2"/>
+              <a:buChar char=""/>
+              <a:defRPr sz="1200" kern="1200">
+                <a:solidFill>
+                  <a:schemeClr val="tx1">
+                    <a:lumMod val="75000"/>
+                    <a:lumOff val="25000"/>
+                  </a:schemeClr>
+                </a:solidFill>
+                <a:latin typeface="+mn-lt"/>
+                <a:ea typeface="+mn-ea"/>
+                <a:cs typeface="+mn-cs"/>
+              </a:defRPr>
+            </a:lvl9pPr>
+          </a:lstStyle>
+          <a:p>
+            <a:pPr marL="0" indent="0" algn="ctr" defTabSz="914400">
+              <a:spcBef>
+                <a:spcPts val="0"/>
+              </a:spcBef>
+              <a:buClrTx/>
+              <a:buSzTx/>
+              <a:buFontTx/>
+              <a:buNone/>
+            </a:pPr>
+            <a:r>
+              <a:rPr lang="es-ES_tradnl" b="1" i="1" dirty="0" smtClean="0"/>
+              <a:t>O(n</a:t>
+            </a:r>
+            <a:r>
+              <a:rPr lang="es-ES_tradnl" b="1" i="1" baseline="30000" dirty="0" smtClean="0"/>
+              <a:t>2</a:t>
+            </a:r>
+            <a:r>
+              <a:rPr lang="es-ES_tradnl" b="1" i="1" dirty="0" smtClean="0"/>
+              <a:t>) -&gt; k * </a:t>
+            </a:r>
+            <a:r>
+              <a:rPr lang="es-ES_tradnl" b="1" i="1" dirty="0"/>
+              <a:t>n</a:t>
+            </a:r>
+            <a:r>
+              <a:rPr lang="es-ES_tradnl" b="1" i="1" baseline="30000" dirty="0"/>
+              <a:t>2</a:t>
+            </a:r>
+            <a:r>
+              <a:rPr lang="es-ES_tradnl" b="1" i="1" dirty="0" smtClean="0"/>
+              <a:t> = número de pasos requeridos.</a:t>
+            </a:r>
+          </a:p>
+          <a:p>
+            <a:pPr marL="0" indent="0" algn="ctr" defTabSz="914400">
+              <a:spcBef>
+                <a:spcPts val="0"/>
+              </a:spcBef>
+              <a:buClrTx/>
+              <a:buSzTx/>
+              <a:buFontTx/>
+              <a:buNone/>
+            </a:pPr>
+            <a:endParaRPr lang="es-ES_tradnl" dirty="0" smtClean="0"/>
+          </a:p>
+          <a:p>
+            <a:pPr marL="0" indent="0" algn="ctr" defTabSz="914400">
+              <a:spcBef>
+                <a:spcPts val="0"/>
+              </a:spcBef>
+              <a:buClrTx/>
+              <a:buSzTx/>
+              <a:buFontTx/>
+              <a:buNone/>
+            </a:pPr>
+            <a:endParaRPr lang="es-ES_tradnl" dirty="0" smtClean="0"/>
+          </a:p>
+          <a:p>
+            <a:pPr marL="0" indent="0" algn="ctr" defTabSz="914400">
+              <a:spcBef>
+                <a:spcPts val="0"/>
+              </a:spcBef>
+              <a:buClrTx/>
+              <a:buSzTx/>
+              <a:buFontTx/>
+              <a:buNone/>
+            </a:pPr>
+            <a:endParaRPr lang="es-ES_tradnl" dirty="0" smtClean="0"/>
+          </a:p>
+          <a:p>
+            <a:pPr marL="0" indent="0" defTabSz="914400">
+              <a:spcBef>
+                <a:spcPts val="0"/>
+              </a:spcBef>
+              <a:buClrTx/>
+              <a:buSzTx/>
+              <a:buFontTx/>
+              <a:buNone/>
+            </a:pPr>
+            <a:endParaRPr lang="es-ES_tradnl" dirty="0" smtClean="0"/>
+          </a:p>
+          <a:p>
+            <a:pPr marL="0" indent="0" defTabSz="914400">
+              <a:spcBef>
+                <a:spcPts val="0"/>
+              </a:spcBef>
+              <a:buClrTx/>
+              <a:buSzTx/>
+              <a:buFontTx/>
+              <a:buNone/>
+            </a:pPr>
+            <a:endParaRPr lang="es-ES_tradnl" dirty="0"/>
+          </a:p>
+        </p:txBody>
+      </p:sp>
+      <p:sp>
+        <p:nvSpPr>
+          <p:cNvPr id="6" name="Content Placeholder 2"/>
+          <p:cNvSpPr txBox="1">
+            <a:spLocks/>
+          </p:cNvSpPr>
+          <p:nvPr/>
+        </p:nvSpPr>
+        <p:spPr>
+          <a:xfrm>
+            <a:off x="877359" y="4453735"/>
+            <a:ext cx="8596668" cy="427034"/>
+          </a:xfrm>
+          <a:prstGeom prst="rect">
+            <a:avLst/>
+          </a:prstGeom>
+        </p:spPr>
+        <p:txBody>
+          <a:bodyPr vert="horz" lIns="91440" tIns="45720" rIns="91440" bIns="45720" rtlCol="0">
+            <a:normAutofit/>
+          </a:bodyPr>
+          <a:lstStyle>
+            <a:lvl1pPr marL="342900" indent="-342900" algn="l" defTabSz="457200" rtl="0" eaLnBrk="1" latinLnBrk="0" hangingPunct="1">
+              <a:spcBef>
+                <a:spcPts val="1000"/>
+              </a:spcBef>
+              <a:spcAft>
+                <a:spcPts val="0"/>
+              </a:spcAft>
+              <a:buClr>
+                <a:schemeClr val="accent1"/>
+              </a:buClr>
+              <a:buSzPct val="80000"/>
+              <a:buFont typeface="Wingdings 3" charset="2"/>
+              <a:buChar char=""/>
+              <a:defRPr sz="1800" kern="1200">
+                <a:solidFill>
+                  <a:schemeClr val="tx1">
+                    <a:lumMod val="75000"/>
+                    <a:lumOff val="25000"/>
+                  </a:schemeClr>
+                </a:solidFill>
+                <a:latin typeface="+mn-lt"/>
+                <a:ea typeface="+mn-ea"/>
+                <a:cs typeface="+mn-cs"/>
+              </a:defRPr>
+            </a:lvl1pPr>
+            <a:lvl2pPr marL="742950" indent="-285750" algn="l" defTabSz="457200" rtl="0" eaLnBrk="1" latinLnBrk="0" hangingPunct="1">
+              <a:spcBef>
+                <a:spcPts val="1000"/>
+              </a:spcBef>
+              <a:spcAft>
+                <a:spcPts val="0"/>
+              </a:spcAft>
+              <a:buClr>
+                <a:schemeClr val="accent1"/>
+              </a:buClr>
+              <a:buSzPct val="80000"/>
+              <a:buFont typeface="Wingdings 3" charset="2"/>
+              <a:buChar char=""/>
+              <a:defRPr sz="1600" kern="1200">
+                <a:solidFill>
+                  <a:schemeClr val="tx1">
+                    <a:lumMod val="75000"/>
+                    <a:lumOff val="25000"/>
+                  </a:schemeClr>
+                </a:solidFill>
+                <a:latin typeface="+mn-lt"/>
+                <a:ea typeface="+mn-ea"/>
+                <a:cs typeface="+mn-cs"/>
+              </a:defRPr>
+            </a:lvl2pPr>
+            <a:lvl3pPr marL="1143000" indent="-228600" algn="l" defTabSz="457200" rtl="0" eaLnBrk="1" latinLnBrk="0" hangingPunct="1">
+              <a:spcBef>
+                <a:spcPts val="1000"/>
+              </a:spcBef>
+              <a:spcAft>
+                <a:spcPts val="0"/>
+              </a:spcAft>
+              <a:buClr>
+                <a:schemeClr val="accent1"/>
+              </a:buClr>
+              <a:buSzPct val="80000"/>
+              <a:buFont typeface="Wingdings 3" charset="2"/>
+              <a:buChar char=""/>
+              <a:defRPr sz="1400" kern="1200">
+                <a:solidFill>
+                  <a:schemeClr val="tx1">
+                    <a:lumMod val="75000"/>
+                    <a:lumOff val="25000"/>
+                  </a:schemeClr>
+                </a:solidFill>
+                <a:latin typeface="+mn-lt"/>
+                <a:ea typeface="+mn-ea"/>
+                <a:cs typeface="+mn-cs"/>
+              </a:defRPr>
+            </a:lvl3pPr>
+            <a:lvl4pPr marL="1600200" indent="-228600" algn="l" defTabSz="457200" rtl="0" eaLnBrk="1" latinLnBrk="0" hangingPunct="1">
+              <a:spcBef>
+                <a:spcPts val="1000"/>
+              </a:spcBef>
+              <a:spcAft>
+                <a:spcPts val="0"/>
+              </a:spcAft>
+              <a:buClr>
+                <a:schemeClr val="accent1"/>
+              </a:buClr>
+              <a:buSzPct val="80000"/>
+              <a:buFont typeface="Wingdings 3" charset="2"/>
+              <a:buChar char=""/>
+              <a:defRPr sz="1200" kern="1200">
+                <a:solidFill>
+                  <a:schemeClr val="tx1">
+                    <a:lumMod val="75000"/>
+                    <a:lumOff val="25000"/>
+                  </a:schemeClr>
+                </a:solidFill>
+                <a:latin typeface="+mn-lt"/>
+                <a:ea typeface="+mn-ea"/>
+                <a:cs typeface="+mn-cs"/>
+              </a:defRPr>
+            </a:lvl4pPr>
+            <a:lvl5pPr marL="2057400" indent="-228600" algn="l" defTabSz="457200" rtl="0" eaLnBrk="1" latinLnBrk="0" hangingPunct="1">
+              <a:spcBef>
+                <a:spcPts val="1000"/>
+              </a:spcBef>
+              <a:spcAft>
+                <a:spcPts val="0"/>
+              </a:spcAft>
+              <a:buClr>
+                <a:schemeClr val="accent1"/>
+              </a:buClr>
+              <a:buSzPct val="80000"/>
+              <a:buFont typeface="Wingdings 3" charset="2"/>
+              <a:buChar char=""/>
+              <a:defRPr sz="1200" kern="1200">
+                <a:solidFill>
+                  <a:schemeClr val="tx1">
+                    <a:lumMod val="75000"/>
+                    <a:lumOff val="25000"/>
+                  </a:schemeClr>
+                </a:solidFill>
+                <a:latin typeface="+mn-lt"/>
+                <a:ea typeface="+mn-ea"/>
+                <a:cs typeface="+mn-cs"/>
+              </a:defRPr>
+            </a:lvl5pPr>
+            <a:lvl6pPr marL="2514600" indent="-228600" algn="l" defTabSz="457200" rtl="0" eaLnBrk="1" latinLnBrk="0" hangingPunct="1">
+              <a:spcBef>
+                <a:spcPts val="1000"/>
+              </a:spcBef>
+              <a:spcAft>
+                <a:spcPts val="0"/>
+              </a:spcAft>
+              <a:buClr>
+                <a:schemeClr val="accent1"/>
+              </a:buClr>
+              <a:buSzPct val="80000"/>
+              <a:buFont typeface="Wingdings 3" charset="2"/>
+              <a:buChar char=""/>
+              <a:defRPr sz="1200" kern="1200">
+                <a:solidFill>
+                  <a:schemeClr val="tx1">
+                    <a:lumMod val="75000"/>
+                    <a:lumOff val="25000"/>
+                  </a:schemeClr>
+                </a:solidFill>
+                <a:latin typeface="+mn-lt"/>
+                <a:ea typeface="+mn-ea"/>
+                <a:cs typeface="+mn-cs"/>
+              </a:defRPr>
+            </a:lvl6pPr>
+            <a:lvl7pPr marL="2971800" indent="-228600" algn="l" defTabSz="457200" rtl="0" eaLnBrk="1" latinLnBrk="0" hangingPunct="1">
+              <a:spcBef>
+                <a:spcPts val="1000"/>
+              </a:spcBef>
+              <a:spcAft>
+                <a:spcPts val="0"/>
+              </a:spcAft>
+              <a:buClr>
+                <a:schemeClr val="accent1"/>
+              </a:buClr>
+              <a:buSzPct val="80000"/>
+              <a:buFont typeface="Wingdings 3" charset="2"/>
+              <a:buChar char=""/>
+              <a:defRPr sz="1200" kern="1200">
+                <a:solidFill>
+                  <a:schemeClr val="tx1">
+                    <a:lumMod val="75000"/>
+                    <a:lumOff val="25000"/>
+                  </a:schemeClr>
+                </a:solidFill>
+                <a:latin typeface="+mn-lt"/>
+                <a:ea typeface="+mn-ea"/>
+                <a:cs typeface="+mn-cs"/>
+              </a:defRPr>
+            </a:lvl7pPr>
+            <a:lvl8pPr marL="3429000" indent="-228600" algn="l" defTabSz="457200" rtl="0" eaLnBrk="1" latinLnBrk="0" hangingPunct="1">
+              <a:spcBef>
+                <a:spcPts val="1000"/>
+              </a:spcBef>
+              <a:spcAft>
+                <a:spcPts val="0"/>
+              </a:spcAft>
+              <a:buClr>
+                <a:schemeClr val="accent1"/>
+              </a:buClr>
+              <a:buSzPct val="80000"/>
+              <a:buFont typeface="Wingdings 3" charset="2"/>
+              <a:buChar char=""/>
+              <a:defRPr sz="1200" kern="1200">
+                <a:solidFill>
+                  <a:schemeClr val="tx1">
+                    <a:lumMod val="75000"/>
+                    <a:lumOff val="25000"/>
+                  </a:schemeClr>
+                </a:solidFill>
+                <a:latin typeface="+mn-lt"/>
+                <a:ea typeface="+mn-ea"/>
+                <a:cs typeface="+mn-cs"/>
+              </a:defRPr>
+            </a:lvl8pPr>
+            <a:lvl9pPr marL="3886200" indent="-228600" algn="l" defTabSz="457200" rtl="0" eaLnBrk="1" latinLnBrk="0" hangingPunct="1">
+              <a:spcBef>
+                <a:spcPts val="1000"/>
+              </a:spcBef>
+              <a:spcAft>
+                <a:spcPts val="0"/>
+              </a:spcAft>
+              <a:buClr>
+                <a:schemeClr val="accent1"/>
+              </a:buClr>
+              <a:buSzPct val="80000"/>
+              <a:buFont typeface="Wingdings 3" charset="2"/>
+              <a:buChar char=""/>
+              <a:defRPr sz="1200" kern="1200">
+                <a:solidFill>
+                  <a:schemeClr val="tx1">
+                    <a:lumMod val="75000"/>
+                    <a:lumOff val="25000"/>
+                  </a:schemeClr>
+                </a:solidFill>
+                <a:latin typeface="+mn-lt"/>
+                <a:ea typeface="+mn-ea"/>
+                <a:cs typeface="+mn-cs"/>
+              </a:defRPr>
+            </a:lvl9pPr>
+          </a:lstStyle>
+          <a:p>
+            <a:pPr marL="0" indent="0" algn="ctr" defTabSz="914400">
+              <a:spcBef>
+                <a:spcPts val="0"/>
+              </a:spcBef>
+              <a:buClrTx/>
+              <a:buSzTx/>
+              <a:buFontTx/>
+              <a:buNone/>
+            </a:pPr>
+            <a:r>
+              <a:rPr lang="es-ES_tradnl" b="1" i="1" dirty="0" smtClean="0"/>
+              <a:t>O(log n) -&gt; k * log n = máxima memoria consumida.</a:t>
+            </a:r>
+            <a:endParaRPr lang="es-ES_tradnl" dirty="0" smtClean="0"/>
+          </a:p>
+          <a:p>
+            <a:pPr marL="0" indent="0" algn="ctr" defTabSz="914400">
+              <a:spcBef>
+                <a:spcPts val="0"/>
+              </a:spcBef>
+              <a:buClrTx/>
+              <a:buSzTx/>
+              <a:buFontTx/>
+              <a:buNone/>
+            </a:pPr>
+            <a:endParaRPr lang="es-ES_tradnl" dirty="0" smtClean="0"/>
+          </a:p>
+          <a:p>
+            <a:pPr marL="0" indent="0" algn="ctr" defTabSz="914400">
+              <a:spcBef>
+                <a:spcPts val="0"/>
+              </a:spcBef>
+              <a:buClrTx/>
+              <a:buSzTx/>
+              <a:buFontTx/>
+              <a:buNone/>
+            </a:pPr>
+            <a:endParaRPr lang="es-ES_tradnl" dirty="0" smtClean="0"/>
+          </a:p>
+          <a:p>
+            <a:pPr marL="0" indent="0" defTabSz="914400">
+              <a:spcBef>
+                <a:spcPts val="0"/>
+              </a:spcBef>
+              <a:buClrTx/>
+              <a:buSzTx/>
+              <a:buFontTx/>
+              <a:buNone/>
+            </a:pPr>
+            <a:endParaRPr lang="es-ES_tradnl" dirty="0" smtClean="0"/>
+          </a:p>
+          <a:p>
+            <a:pPr marL="0" indent="0" defTabSz="914400">
+              <a:spcBef>
+                <a:spcPts val="0"/>
+              </a:spcBef>
+              <a:buClrTx/>
+              <a:buSzTx/>
+              <a:buFontTx/>
+              <a:buNone/>
+            </a:pPr>
+            <a:endParaRPr lang="es-ES_tradnl" dirty="0"/>
+          </a:p>
+        </p:txBody>
+      </p:sp>
+      <p:sp>
+        <p:nvSpPr>
+          <p:cNvPr id="8" name="Content Placeholder 2"/>
+          <p:cNvSpPr txBox="1">
+            <a:spLocks/>
+          </p:cNvSpPr>
+          <p:nvPr/>
+        </p:nvSpPr>
+        <p:spPr>
+          <a:xfrm>
+            <a:off x="677334" y="4925634"/>
+            <a:ext cx="8596668" cy="427034"/>
+          </a:xfrm>
+          <a:prstGeom prst="rect">
+            <a:avLst/>
+          </a:prstGeom>
+        </p:spPr>
+        <p:txBody>
+          <a:bodyPr vert="horz" lIns="91440" tIns="45720" rIns="91440" bIns="45720" rtlCol="0">
+            <a:normAutofit/>
+          </a:bodyPr>
+          <a:lstStyle>
+            <a:lvl1pPr marL="342900" indent="-342900" algn="l" defTabSz="457200" rtl="0" eaLnBrk="1" latinLnBrk="0" hangingPunct="1">
+              <a:spcBef>
+                <a:spcPts val="1000"/>
+              </a:spcBef>
+              <a:spcAft>
+                <a:spcPts val="0"/>
+              </a:spcAft>
+              <a:buClr>
+                <a:schemeClr val="accent1"/>
+              </a:buClr>
+              <a:buSzPct val="80000"/>
+              <a:buFont typeface="Wingdings 3" charset="2"/>
+              <a:buChar char=""/>
+              <a:defRPr sz="1800" kern="1200">
+                <a:solidFill>
+                  <a:schemeClr val="tx1">
+                    <a:lumMod val="75000"/>
+                    <a:lumOff val="25000"/>
+                  </a:schemeClr>
+                </a:solidFill>
+                <a:latin typeface="+mn-lt"/>
+                <a:ea typeface="+mn-ea"/>
+                <a:cs typeface="+mn-cs"/>
+              </a:defRPr>
+            </a:lvl1pPr>
+            <a:lvl2pPr marL="742950" indent="-285750" algn="l" defTabSz="457200" rtl="0" eaLnBrk="1" latinLnBrk="0" hangingPunct="1">
+              <a:spcBef>
+                <a:spcPts val="1000"/>
+              </a:spcBef>
+              <a:spcAft>
+                <a:spcPts val="0"/>
+              </a:spcAft>
+              <a:buClr>
+                <a:schemeClr val="accent1"/>
+              </a:buClr>
+              <a:buSzPct val="80000"/>
+              <a:buFont typeface="Wingdings 3" charset="2"/>
+              <a:buChar char=""/>
+              <a:defRPr sz="1600" kern="1200">
+                <a:solidFill>
+                  <a:schemeClr val="tx1">
+                    <a:lumMod val="75000"/>
+                    <a:lumOff val="25000"/>
+                  </a:schemeClr>
+                </a:solidFill>
+                <a:latin typeface="+mn-lt"/>
+                <a:ea typeface="+mn-ea"/>
+                <a:cs typeface="+mn-cs"/>
+              </a:defRPr>
+            </a:lvl2pPr>
+            <a:lvl3pPr marL="1143000" indent="-228600" algn="l" defTabSz="457200" rtl="0" eaLnBrk="1" latinLnBrk="0" hangingPunct="1">
+              <a:spcBef>
+                <a:spcPts val="1000"/>
+              </a:spcBef>
+              <a:spcAft>
+                <a:spcPts val="0"/>
+              </a:spcAft>
+              <a:buClr>
+                <a:schemeClr val="accent1"/>
+              </a:buClr>
+              <a:buSzPct val="80000"/>
+              <a:buFont typeface="Wingdings 3" charset="2"/>
+              <a:buChar char=""/>
+              <a:defRPr sz="1400" kern="1200">
+                <a:solidFill>
+                  <a:schemeClr val="tx1">
+                    <a:lumMod val="75000"/>
+                    <a:lumOff val="25000"/>
+                  </a:schemeClr>
+                </a:solidFill>
+                <a:latin typeface="+mn-lt"/>
+                <a:ea typeface="+mn-ea"/>
+                <a:cs typeface="+mn-cs"/>
+              </a:defRPr>
+            </a:lvl3pPr>
+            <a:lvl4pPr marL="1600200" indent="-228600" algn="l" defTabSz="457200" rtl="0" eaLnBrk="1" latinLnBrk="0" hangingPunct="1">
+              <a:spcBef>
+                <a:spcPts val="1000"/>
+              </a:spcBef>
+              <a:spcAft>
+                <a:spcPts val="0"/>
+              </a:spcAft>
+              <a:buClr>
+                <a:schemeClr val="accent1"/>
+              </a:buClr>
+              <a:buSzPct val="80000"/>
+              <a:buFont typeface="Wingdings 3" charset="2"/>
+              <a:buChar char=""/>
+              <a:defRPr sz="1200" kern="1200">
+                <a:solidFill>
+                  <a:schemeClr val="tx1">
+                    <a:lumMod val="75000"/>
+                    <a:lumOff val="25000"/>
+                  </a:schemeClr>
+                </a:solidFill>
+                <a:latin typeface="+mn-lt"/>
+                <a:ea typeface="+mn-ea"/>
+                <a:cs typeface="+mn-cs"/>
+              </a:defRPr>
+            </a:lvl4pPr>
+            <a:lvl5pPr marL="2057400" indent="-228600" algn="l" defTabSz="457200" rtl="0" eaLnBrk="1" latinLnBrk="0" hangingPunct="1">
+              <a:spcBef>
+                <a:spcPts val="1000"/>
+              </a:spcBef>
+              <a:spcAft>
+                <a:spcPts val="0"/>
+              </a:spcAft>
+              <a:buClr>
+                <a:schemeClr val="accent1"/>
+              </a:buClr>
+              <a:buSzPct val="80000"/>
+              <a:buFont typeface="Wingdings 3" charset="2"/>
+              <a:buChar char=""/>
+              <a:defRPr sz="1200" kern="1200">
+                <a:solidFill>
+                  <a:schemeClr val="tx1">
+                    <a:lumMod val="75000"/>
+                    <a:lumOff val="25000"/>
+                  </a:schemeClr>
+                </a:solidFill>
+                <a:latin typeface="+mn-lt"/>
+                <a:ea typeface="+mn-ea"/>
+                <a:cs typeface="+mn-cs"/>
+              </a:defRPr>
+            </a:lvl5pPr>
+            <a:lvl6pPr marL="2514600" indent="-228600" algn="l" defTabSz="457200" rtl="0" eaLnBrk="1" latinLnBrk="0" hangingPunct="1">
+              <a:spcBef>
+                <a:spcPts val="1000"/>
+              </a:spcBef>
+              <a:spcAft>
+                <a:spcPts val="0"/>
+              </a:spcAft>
+              <a:buClr>
+                <a:schemeClr val="accent1"/>
+              </a:buClr>
+              <a:buSzPct val="80000"/>
+              <a:buFont typeface="Wingdings 3" charset="2"/>
+              <a:buChar char=""/>
+              <a:defRPr sz="1200" kern="1200">
+                <a:solidFill>
+                  <a:schemeClr val="tx1">
+                    <a:lumMod val="75000"/>
+                    <a:lumOff val="25000"/>
+                  </a:schemeClr>
+                </a:solidFill>
+                <a:latin typeface="+mn-lt"/>
+                <a:ea typeface="+mn-ea"/>
+                <a:cs typeface="+mn-cs"/>
+              </a:defRPr>
+            </a:lvl6pPr>
+            <a:lvl7pPr marL="2971800" indent="-228600" algn="l" defTabSz="457200" rtl="0" eaLnBrk="1" latinLnBrk="0" hangingPunct="1">
+              <a:spcBef>
+                <a:spcPts val="1000"/>
+              </a:spcBef>
+              <a:spcAft>
+                <a:spcPts val="0"/>
+              </a:spcAft>
+              <a:buClr>
+                <a:schemeClr val="accent1"/>
+              </a:buClr>
+              <a:buSzPct val="80000"/>
+              <a:buFont typeface="Wingdings 3" charset="2"/>
+              <a:buChar char=""/>
+              <a:defRPr sz="1200" kern="1200">
+                <a:solidFill>
+                  <a:schemeClr val="tx1">
+                    <a:lumMod val="75000"/>
+                    <a:lumOff val="25000"/>
+                  </a:schemeClr>
+                </a:solidFill>
+                <a:latin typeface="+mn-lt"/>
+                <a:ea typeface="+mn-ea"/>
+                <a:cs typeface="+mn-cs"/>
+              </a:defRPr>
+            </a:lvl7pPr>
+            <a:lvl8pPr marL="3429000" indent="-228600" algn="l" defTabSz="457200" rtl="0" eaLnBrk="1" latinLnBrk="0" hangingPunct="1">
+              <a:spcBef>
+                <a:spcPts val="1000"/>
+              </a:spcBef>
+              <a:spcAft>
+                <a:spcPts val="0"/>
+              </a:spcAft>
+              <a:buClr>
+                <a:schemeClr val="accent1"/>
+              </a:buClr>
+              <a:buSzPct val="80000"/>
+              <a:buFont typeface="Wingdings 3" charset="2"/>
+              <a:buChar char=""/>
+              <a:defRPr sz="1200" kern="1200">
+                <a:solidFill>
+                  <a:schemeClr val="tx1">
+                    <a:lumMod val="75000"/>
+                    <a:lumOff val="25000"/>
+                  </a:schemeClr>
+                </a:solidFill>
+                <a:latin typeface="+mn-lt"/>
+                <a:ea typeface="+mn-ea"/>
+                <a:cs typeface="+mn-cs"/>
+              </a:defRPr>
+            </a:lvl8pPr>
+            <a:lvl9pPr marL="3886200" indent="-228600" algn="l" defTabSz="457200" rtl="0" eaLnBrk="1" latinLnBrk="0" hangingPunct="1">
+              <a:spcBef>
+                <a:spcPts val="1000"/>
+              </a:spcBef>
+              <a:spcAft>
+                <a:spcPts val="0"/>
+              </a:spcAft>
+              <a:buClr>
+                <a:schemeClr val="accent1"/>
+              </a:buClr>
+              <a:buSzPct val="80000"/>
+              <a:buFont typeface="Wingdings 3" charset="2"/>
+              <a:buChar char=""/>
+              <a:defRPr sz="1200" kern="1200">
+                <a:solidFill>
+                  <a:schemeClr val="tx1">
+                    <a:lumMod val="75000"/>
+                    <a:lumOff val="25000"/>
+                  </a:schemeClr>
+                </a:solidFill>
+                <a:latin typeface="+mn-lt"/>
+                <a:ea typeface="+mn-ea"/>
+                <a:cs typeface="+mn-cs"/>
+              </a:defRPr>
+            </a:lvl9pPr>
+          </a:lstStyle>
+          <a:p>
+            <a:pPr marL="0" indent="0" algn="ctr" defTabSz="914400">
+              <a:spcBef>
+                <a:spcPts val="0"/>
+              </a:spcBef>
+              <a:buClrTx/>
+              <a:buSzTx/>
+              <a:buFontTx/>
+              <a:buNone/>
+            </a:pPr>
+            <a:r>
+              <a:rPr lang="es-ES_tradnl" b="1" i="1" dirty="0" smtClean="0"/>
+              <a:t>O(1) -&gt; k * 1 = máxima memoria consumida.</a:t>
+            </a:r>
+            <a:endParaRPr lang="es-ES_tradnl" dirty="0" smtClean="0"/>
+          </a:p>
+          <a:p>
+            <a:pPr marL="0" indent="0" algn="ctr" defTabSz="914400">
+              <a:spcBef>
+                <a:spcPts val="0"/>
+              </a:spcBef>
+              <a:buClrTx/>
+              <a:buSzTx/>
+              <a:buFontTx/>
+              <a:buNone/>
+            </a:pPr>
+            <a:endParaRPr lang="es-ES_tradnl" dirty="0" smtClean="0"/>
+          </a:p>
+          <a:p>
+            <a:pPr marL="0" indent="0" algn="ctr" defTabSz="914400">
+              <a:spcBef>
+                <a:spcPts val="0"/>
+              </a:spcBef>
+              <a:buClrTx/>
+              <a:buSzTx/>
+              <a:buFontTx/>
+              <a:buNone/>
+            </a:pPr>
+            <a:endParaRPr lang="es-ES_tradnl" dirty="0" smtClean="0"/>
+          </a:p>
+          <a:p>
+            <a:pPr marL="0" indent="0" defTabSz="914400">
+              <a:spcBef>
+                <a:spcPts val="0"/>
+              </a:spcBef>
+              <a:buClrTx/>
+              <a:buSzTx/>
+              <a:buFontTx/>
+              <a:buNone/>
+            </a:pPr>
+            <a:endParaRPr lang="es-ES_tradnl" dirty="0" smtClean="0"/>
+          </a:p>
+          <a:p>
+            <a:pPr marL="0" indent="0" defTabSz="914400">
+              <a:spcBef>
+                <a:spcPts val="0"/>
+              </a:spcBef>
+              <a:buClrTx/>
+              <a:buSzTx/>
+              <a:buFontTx/>
+              <a:buNone/>
+            </a:pPr>
+            <a:endParaRPr lang="es-ES_tradnl" dirty="0"/>
+          </a:p>
+        </p:txBody>
+      </p:sp>
+      <p:sp>
+        <p:nvSpPr>
+          <p:cNvPr id="9" name="Left Brace 8"/>
+          <p:cNvSpPr/>
+          <p:nvPr/>
+        </p:nvSpPr>
+        <p:spPr>
+          <a:xfrm>
+            <a:off x="1914526" y="3031337"/>
+            <a:ext cx="385762" cy="1208881"/>
+          </a:xfrm>
+          <a:prstGeom prst="leftBrace">
+            <a:avLst/>
+          </a:prstGeom>
+        </p:spPr>
+        <p:style>
+          <a:lnRef idx="1">
+            <a:schemeClr val="accent1"/>
+          </a:lnRef>
+          <a:fillRef idx="0">
+            <a:schemeClr val="accent1"/>
+          </a:fillRef>
+          <a:effectRef idx="0">
+            <a:schemeClr val="accent1"/>
+          </a:effectRef>
+          <a:fontRef idx="minor">
+            <a:schemeClr val="tx1"/>
+          </a:fontRef>
+        </p:style>
+        <p:txBody>
+          <a:bodyPr rtlCol="0" anchor="ctr"/>
+          <a:lstStyle/>
+          <a:p>
+            <a:pPr algn="ctr"/>
+            <a:endParaRPr lang="es-ES_tradnl"/>
+          </a:p>
+        </p:txBody>
+      </p:sp>
+      <p:sp>
+        <p:nvSpPr>
+          <p:cNvPr id="10" name="Left Brace 9"/>
+          <p:cNvSpPr/>
+          <p:nvPr/>
+        </p:nvSpPr>
+        <p:spPr>
+          <a:xfrm>
+            <a:off x="1914526" y="4287057"/>
+            <a:ext cx="385762" cy="1208881"/>
+          </a:xfrm>
+          <a:prstGeom prst="leftBrace">
+            <a:avLst/>
+          </a:prstGeom>
+        </p:spPr>
+        <p:style>
+          <a:lnRef idx="1">
+            <a:schemeClr val="accent1"/>
+          </a:lnRef>
+          <a:fillRef idx="0">
+            <a:schemeClr val="accent1"/>
+          </a:fillRef>
+          <a:effectRef idx="0">
+            <a:schemeClr val="accent1"/>
+          </a:effectRef>
+          <a:fontRef idx="minor">
+            <a:schemeClr val="tx1"/>
+          </a:fontRef>
+        </p:style>
+        <p:txBody>
+          <a:bodyPr rtlCol="0" anchor="ctr"/>
+          <a:lstStyle/>
+          <a:p>
+            <a:pPr algn="ctr"/>
+            <a:endParaRPr lang="es-ES_tradnl"/>
+          </a:p>
+        </p:txBody>
+      </p:sp>
+      <p:sp>
+        <p:nvSpPr>
+          <p:cNvPr id="11" name="TextBox 10"/>
+          <p:cNvSpPr txBox="1"/>
+          <p:nvPr/>
+        </p:nvSpPr>
+        <p:spPr>
+          <a:xfrm>
+            <a:off x="448734" y="3228181"/>
+            <a:ext cx="1308629" cy="923330"/>
+          </a:xfrm>
+          <a:prstGeom prst="rect">
+            <a:avLst/>
+          </a:prstGeom>
+          <a:noFill/>
+        </p:spPr>
+        <p:txBody>
+          <a:bodyPr wrap="square" rtlCol="0">
+            <a:spAutoFit/>
+          </a:bodyPr>
+          <a:lstStyle/>
+          <a:p>
+            <a:r>
+              <a:rPr lang="es-ES_tradnl" dirty="0" smtClean="0"/>
+              <a:t>Aplicado a cómputo/pasos</a:t>
+            </a:r>
+            <a:endParaRPr lang="es-ES_tradnl" dirty="0"/>
+          </a:p>
+        </p:txBody>
+      </p:sp>
+      <p:sp>
+        <p:nvSpPr>
+          <p:cNvPr id="12" name="TextBox 11"/>
+          <p:cNvSpPr txBox="1"/>
+          <p:nvPr/>
+        </p:nvSpPr>
+        <p:spPr>
+          <a:xfrm>
+            <a:off x="448734" y="4536662"/>
+            <a:ext cx="1308629" cy="646331"/>
+          </a:xfrm>
+          <a:prstGeom prst="rect">
+            <a:avLst/>
+          </a:prstGeom>
+          <a:noFill/>
+        </p:spPr>
+        <p:txBody>
+          <a:bodyPr wrap="square" rtlCol="0">
+            <a:spAutoFit/>
+          </a:bodyPr>
+          <a:lstStyle/>
+          <a:p>
+            <a:r>
+              <a:rPr lang="es-ES_tradnl" dirty="0" smtClean="0"/>
+              <a:t>Espacio de memoria</a:t>
+            </a:r>
+            <a:endParaRPr lang="es-ES_tradnl" dirty="0"/>
+          </a:p>
+        </p:txBody>
+      </p:sp>
+    </p:spTree>
+    <p:extLst>
+      <p:ext uri="{BB962C8B-B14F-4D97-AF65-F5344CB8AC3E}">
+        <p14:creationId xmlns:p14="http://schemas.microsoft.com/office/powerpoint/2010/main" val="67651234"/>
+      </p:ext>
+    </p:extLst>
+  </p:cSld>
+  <p:clrMapOvr>
+    <a:masterClrMapping/>
+  </p:clrMapOvr>
+</p:sld>
+</file>
+
 <file path=ppt/slides/slide2.xml><?xml version="1.0" encoding="utf-8"?>
 <p:sld xmlns:a="http://schemas.openxmlformats.org/drawingml/2006/main" xmlns:r="http://schemas.openxmlformats.org/officeDocument/2006/relationships" xmlns:p="http://schemas.openxmlformats.org/presentationml/2006/main">
   <p:cSld>
@@ -8145,6 +10411,60 @@
       </p:par>
     </p:tnLst>
   </p:timing>
+</p:sld>
+</file>
+
+<file path=ppt/slides/slide20.xml><?xml version="1.0" encoding="utf-8"?>
+<p:sld xmlns:a="http://schemas.openxmlformats.org/drawingml/2006/main" xmlns:r="http://schemas.openxmlformats.org/officeDocument/2006/relationships" xmlns:p="http://schemas.openxmlformats.org/presentationml/2006/main">
+  <p:cSld>
+    <p:spTree>
+      <p:nvGrpSpPr>
+        <p:cNvPr id="1" name=""/>
+        <p:cNvGrpSpPr/>
+        <p:nvPr/>
+      </p:nvGrpSpPr>
+      <p:grpSpPr>
+        <a:xfrm>
+          <a:off x="0" y="0"/>
+          <a:ext cx="0" cy="0"/>
+          <a:chOff x="0" y="0"/>
+          <a:chExt cx="0" cy="0"/>
+        </a:xfrm>
+      </p:grpSpPr>
+      <p:sp>
+        <p:nvSpPr>
+          <p:cNvPr id="2" name="Title 1"/>
+          <p:cNvSpPr>
+            <a:spLocks noGrp="1"/>
+          </p:cNvSpPr>
+          <p:nvPr>
+            <p:ph type="ctrTitle"/>
+          </p:nvPr>
+        </p:nvSpPr>
+        <p:spPr/>
+        <p:txBody>
+          <a:bodyPr/>
+          <a:lstStyle/>
+          <a:p>
+            <a:pPr algn="ctr"/>
+            <a:r>
+              <a:rPr lang="es-ES_tradnl" dirty="0" smtClean="0"/>
+              <a:t>Consultas</a:t>
+            </a:r>
+            <a:endParaRPr lang="es-ES_tradnl" dirty="0"/>
+          </a:p>
+        </p:txBody>
+      </p:sp>
+    </p:spTree>
+    <p:extLst>
+      <p:ext uri="{BB962C8B-B14F-4D97-AF65-F5344CB8AC3E}">
+        <p14:creationId xmlns:p14="http://schemas.microsoft.com/office/powerpoint/2010/main" val="808400935"/>
+      </p:ext>
+    </p:extLst>
+  </p:cSld>
+  <p:clrMapOvr>
+    <a:masterClrMapping/>
+  </p:clrMapOvr>
 </p:sld>
 </file>
 

</xml_diff>